<commit_message>
(1) new architecture figure; (2) added citations; (3) minor text edits; (4) updated list of europa applications
</commit_message>
<xml_diff>
--- a/Publications/trunk/2012/IKEPS/CameraReady/Figures/Figures.pptx
+++ b/Publications/trunk/2012/IKEPS/CameraReady/Figures/Figures.pptx
@@ -19,6 +19,7 @@
     <p:sldId id="267" r:id="rId13"/>
     <p:sldId id="268" r:id="rId14"/>
     <p:sldId id="269" r:id="rId15"/>
+    <p:sldId id="270" r:id="rId16"/>
   </p:sldIdLst>
   <p:sldSz cx="9144000" cy="6858000" type="screen4x3"/>
   <p:notesSz cx="6858000" cy="9144000"/>
@@ -301,7 +302,7 @@
           <a:p>
             <a:fld id="{1E9B8AF5-EFAB-3141-9A6D-82E91B20F679}" type="datetimeFigureOut">
               <a:rPr lang="en-US" smtClean="0"/>
-              <a:t>5/17/12</a:t>
+              <a:t>5/23/12</a:t>
             </a:fld>
             <a:endParaRPr lang="en-US"/>
           </a:p>
@@ -471,7 +472,7 @@
           <a:p>
             <a:fld id="{1E9B8AF5-EFAB-3141-9A6D-82E91B20F679}" type="datetimeFigureOut">
               <a:rPr lang="en-US" smtClean="0"/>
-              <a:t>5/17/12</a:t>
+              <a:t>5/23/12</a:t>
             </a:fld>
             <a:endParaRPr lang="en-US"/>
           </a:p>
@@ -651,7 +652,7 @@
           <a:p>
             <a:fld id="{1E9B8AF5-EFAB-3141-9A6D-82E91B20F679}" type="datetimeFigureOut">
               <a:rPr lang="en-US" smtClean="0"/>
-              <a:t>5/17/12</a:t>
+              <a:t>5/23/12</a:t>
             </a:fld>
             <a:endParaRPr lang="en-US"/>
           </a:p>
@@ -821,7 +822,7 @@
           <a:p>
             <a:fld id="{1E9B8AF5-EFAB-3141-9A6D-82E91B20F679}" type="datetimeFigureOut">
               <a:rPr lang="en-US" smtClean="0"/>
-              <a:t>5/17/12</a:t>
+              <a:t>5/23/12</a:t>
             </a:fld>
             <a:endParaRPr lang="en-US"/>
           </a:p>
@@ -1067,7 +1068,7 @@
           <a:p>
             <a:fld id="{1E9B8AF5-EFAB-3141-9A6D-82E91B20F679}" type="datetimeFigureOut">
               <a:rPr lang="en-US" smtClean="0"/>
-              <a:t>5/17/12</a:t>
+              <a:t>5/23/12</a:t>
             </a:fld>
             <a:endParaRPr lang="en-US"/>
           </a:p>
@@ -1355,7 +1356,7 @@
           <a:p>
             <a:fld id="{1E9B8AF5-EFAB-3141-9A6D-82E91B20F679}" type="datetimeFigureOut">
               <a:rPr lang="en-US" smtClean="0"/>
-              <a:t>5/17/12</a:t>
+              <a:t>5/23/12</a:t>
             </a:fld>
             <a:endParaRPr lang="en-US"/>
           </a:p>
@@ -1777,7 +1778,7 @@
           <a:p>
             <a:fld id="{1E9B8AF5-EFAB-3141-9A6D-82E91B20F679}" type="datetimeFigureOut">
               <a:rPr lang="en-US" smtClean="0"/>
-              <a:t>5/17/12</a:t>
+              <a:t>5/23/12</a:t>
             </a:fld>
             <a:endParaRPr lang="en-US"/>
           </a:p>
@@ -1895,7 +1896,7 @@
           <a:p>
             <a:fld id="{1E9B8AF5-EFAB-3141-9A6D-82E91B20F679}" type="datetimeFigureOut">
               <a:rPr lang="en-US" smtClean="0"/>
-              <a:t>5/17/12</a:t>
+              <a:t>5/23/12</a:t>
             </a:fld>
             <a:endParaRPr lang="en-US"/>
           </a:p>
@@ -1990,7 +1991,7 @@
           <a:p>
             <a:fld id="{1E9B8AF5-EFAB-3141-9A6D-82E91B20F679}" type="datetimeFigureOut">
               <a:rPr lang="en-US" smtClean="0"/>
-              <a:t>5/17/12</a:t>
+              <a:t>5/23/12</a:t>
             </a:fld>
             <a:endParaRPr lang="en-US"/>
           </a:p>
@@ -2267,7 +2268,7 @@
           <a:p>
             <a:fld id="{1E9B8AF5-EFAB-3141-9A6D-82E91B20F679}" type="datetimeFigureOut">
               <a:rPr lang="en-US" smtClean="0"/>
-              <a:t>5/17/12</a:t>
+              <a:t>5/23/12</a:t>
             </a:fld>
             <a:endParaRPr lang="en-US"/>
           </a:p>
@@ -2520,7 +2521,7 @@
           <a:p>
             <a:fld id="{1E9B8AF5-EFAB-3141-9A6D-82E91B20F679}" type="datetimeFigureOut">
               <a:rPr lang="en-US" smtClean="0"/>
-              <a:t>5/17/12</a:t>
+              <a:t>5/23/12</a:t>
             </a:fld>
             <a:endParaRPr lang="en-US"/>
           </a:p>
@@ -2733,7 +2734,7 @@
           <a:p>
             <a:fld id="{1E9B8AF5-EFAB-3141-9A6D-82E91B20F679}" type="datetimeFigureOut">
               <a:rPr lang="en-US" smtClean="0"/>
-              <a:t>5/17/12</a:t>
+              <a:t>5/23/12</a:t>
             </a:fld>
             <a:endParaRPr lang="en-US"/>
           </a:p>
@@ -3566,12 +3567,12 @@
           <a:graphicData uri="http://schemas.openxmlformats.org/presentationml/2006/ole">
             <mc:AlternateContent xmlns:mc="http://schemas.openxmlformats.org/markup-compatibility/2006">
               <mc:Choice xmlns:v="urn:schemas-microsoft-com:vml" Requires="v">
-                <p:oleObj spid="_x0000_s1030" name="Document" r:id="rId3" imgW="5867400" imgH="2971800" progId="Word.Document.12">
+                <p:oleObj spid="_x0000_s1038" name="Document" r:id="rId4" imgW="5867400" imgH="2971800" progId="Word.Document.12">
                   <p:embed/>
                 </p:oleObj>
               </mc:Choice>
               <mc:Fallback>
-                <p:oleObj name="Document" r:id="rId3" imgW="5867400" imgH="2971800" progId="Word.Document.12">
+                <p:oleObj name="Document" r:id="rId4" imgW="5867400" imgH="2971800" progId="Word.Document.12">
                   <p:embed/>
                   <p:pic>
                     <p:nvPicPr>
@@ -3580,7 +3581,7 @@
                       <p:nvPr/>
                     </p:nvPicPr>
                     <p:blipFill>
-                      <a:blip r:embed="rId4"/>
+                      <a:blip r:embed="rId5"/>
                       <a:stretch>
                         <a:fillRect/>
                       </a:stretch>
@@ -3808,6 +3809,1174 @@
     <p:extLst>
       <p:ext uri="{BB962C8B-B14F-4D97-AF65-F5344CB8AC3E}">
         <p14:creationId xmlns:p14="http://schemas.microsoft.com/office/powerpoint/2010/main" val="3816311257"/>
+      </p:ext>
+    </p:extLst>
+  </p:cSld>
+  <p:clrMapOvr>
+    <a:masterClrMapping/>
+  </p:clrMapOvr>
+</p:sld>
+</file>
+
+<file path=ppt/slides/slide15.xml><?xml version="1.0" encoding="utf-8"?>
+<p:sld xmlns:a="http://schemas.openxmlformats.org/drawingml/2006/main" xmlns:r="http://schemas.openxmlformats.org/officeDocument/2006/relationships" xmlns:p="http://schemas.openxmlformats.org/presentationml/2006/main">
+  <p:cSld>
+    <p:spTree>
+      <p:nvGrpSpPr>
+        <p:cNvPr id="1" name=""/>
+        <p:cNvGrpSpPr/>
+        <p:nvPr/>
+      </p:nvGrpSpPr>
+      <p:grpSpPr>
+        <a:xfrm>
+          <a:off x="0" y="0"/>
+          <a:ext cx="0" cy="0"/>
+          <a:chOff x="0" y="0"/>
+          <a:chExt cx="0" cy="0"/>
+        </a:xfrm>
+      </p:grpSpPr>
+      <p:sp>
+        <p:nvSpPr>
+          <p:cNvPr id="2" name="Rounded Rectangle 1"/>
+          <p:cNvSpPr/>
+          <p:nvPr/>
+        </p:nvSpPr>
+        <p:spPr>
+          <a:xfrm>
+            <a:off x="1470470" y="4918738"/>
+            <a:ext cx="6187187" cy="1447138"/>
+          </a:xfrm>
+          <a:prstGeom prst="roundRect">
+            <a:avLst/>
+          </a:prstGeom>
+          <a:noFill/>
+        </p:spPr>
+        <p:style>
+          <a:lnRef idx="1">
+            <a:schemeClr val="accent1"/>
+          </a:lnRef>
+          <a:fillRef idx="3">
+            <a:schemeClr val="accent1"/>
+          </a:fillRef>
+          <a:effectRef idx="2">
+            <a:schemeClr val="accent1"/>
+          </a:effectRef>
+          <a:fontRef idx="minor">
+            <a:schemeClr val="lt1"/>
+          </a:fontRef>
+        </p:style>
+        <p:txBody>
+          <a:bodyPr rtlCol="0" anchor="ctr"/>
+          <a:lstStyle/>
+          <a:p>
+            <a:pPr algn="ctr"/>
+            <a:endParaRPr lang="en-US" dirty="0"/>
+          </a:p>
+        </p:txBody>
+      </p:sp>
+      <p:sp>
+        <p:nvSpPr>
+          <p:cNvPr id="3" name="TextBox 2"/>
+          <p:cNvSpPr txBox="1"/>
+          <p:nvPr/>
+        </p:nvSpPr>
+        <p:spPr>
+          <a:xfrm>
+            <a:off x="3702289" y="4918737"/>
+            <a:ext cx="1633004" cy="369332"/>
+          </a:xfrm>
+          <a:prstGeom prst="rect">
+            <a:avLst/>
+          </a:prstGeom>
+          <a:noFill/>
+        </p:spPr>
+        <p:txBody>
+          <a:bodyPr wrap="none" rtlCol="0">
+            <a:spAutoFit/>
+          </a:bodyPr>
+          <a:lstStyle/>
+          <a:p>
+            <a:r>
+              <a:rPr lang="en-US" dirty="0" smtClean="0"/>
+              <a:t>EUROPA Kernel</a:t>
+            </a:r>
+            <a:endParaRPr lang="en-US" dirty="0"/>
+          </a:p>
+        </p:txBody>
+      </p:sp>
+      <p:sp>
+        <p:nvSpPr>
+          <p:cNvPr id="4" name="Rectangle 3"/>
+          <p:cNvSpPr/>
+          <p:nvPr/>
+        </p:nvSpPr>
+        <p:spPr>
+          <a:xfrm>
+            <a:off x="1552518" y="5458434"/>
+            <a:ext cx="1096703" cy="729116"/>
+          </a:xfrm>
+          <a:prstGeom prst="rect">
+            <a:avLst/>
+          </a:prstGeom>
+          <a:solidFill>
+            <a:schemeClr val="accent3">
+              <a:lumMod val="20000"/>
+              <a:lumOff val="80000"/>
+            </a:schemeClr>
+          </a:solidFill>
+        </p:spPr>
+        <p:style>
+          <a:lnRef idx="1">
+            <a:schemeClr val="accent1"/>
+          </a:lnRef>
+          <a:fillRef idx="2">
+            <a:schemeClr val="accent1"/>
+          </a:fillRef>
+          <a:effectRef idx="1">
+            <a:schemeClr val="accent1"/>
+          </a:effectRef>
+          <a:fontRef idx="minor">
+            <a:schemeClr val="dk1"/>
+          </a:fontRef>
+        </p:style>
+        <p:txBody>
+          <a:bodyPr rtlCol="0" anchor="ctr"/>
+          <a:lstStyle/>
+          <a:p>
+            <a:pPr algn="ctr"/>
+            <a:r>
+              <a:rPr lang="en-US" sz="1600" dirty="0" smtClean="0">
+                <a:solidFill>
+                  <a:schemeClr val="tx1"/>
+                </a:solidFill>
+              </a:rPr>
+              <a:t>Rule</a:t>
+            </a:r>
+          </a:p>
+          <a:p>
+            <a:pPr algn="ctr"/>
+            <a:r>
+              <a:rPr lang="en-US" sz="1600" dirty="0" smtClean="0">
+                <a:solidFill>
+                  <a:schemeClr val="tx1"/>
+                </a:solidFill>
+              </a:rPr>
+              <a:t>Engine</a:t>
+            </a:r>
+            <a:endParaRPr lang="en-US" sz="1600" dirty="0">
+              <a:solidFill>
+                <a:schemeClr val="tx1"/>
+              </a:solidFill>
+            </a:endParaRPr>
+          </a:p>
+        </p:txBody>
+      </p:sp>
+      <p:sp>
+        <p:nvSpPr>
+          <p:cNvPr id="5" name="Rectangle 4"/>
+          <p:cNvSpPr/>
+          <p:nvPr/>
+        </p:nvSpPr>
+        <p:spPr>
+          <a:xfrm>
+            <a:off x="2786804" y="5458434"/>
+            <a:ext cx="1096703" cy="729116"/>
+          </a:xfrm>
+          <a:prstGeom prst="rect">
+            <a:avLst/>
+          </a:prstGeom>
+          <a:solidFill>
+            <a:schemeClr val="accent3">
+              <a:lumMod val="20000"/>
+              <a:lumOff val="80000"/>
+            </a:schemeClr>
+          </a:solidFill>
+        </p:spPr>
+        <p:style>
+          <a:lnRef idx="1">
+            <a:schemeClr val="accent1"/>
+          </a:lnRef>
+          <a:fillRef idx="2">
+            <a:schemeClr val="accent1"/>
+          </a:fillRef>
+          <a:effectRef idx="1">
+            <a:schemeClr val="accent1"/>
+          </a:effectRef>
+          <a:fontRef idx="minor">
+            <a:schemeClr val="dk1"/>
+          </a:fontRef>
+        </p:style>
+        <p:txBody>
+          <a:bodyPr rtlCol="0" anchor="ctr"/>
+          <a:lstStyle/>
+          <a:p>
+            <a:pPr algn="ctr"/>
+            <a:r>
+              <a:rPr lang="en-US" sz="1600" dirty="0" smtClean="0">
+                <a:solidFill>
+                  <a:schemeClr val="tx1"/>
+                </a:solidFill>
+              </a:rPr>
+              <a:t>Solvers</a:t>
+            </a:r>
+            <a:endParaRPr lang="en-US" sz="1600" dirty="0">
+              <a:solidFill>
+                <a:schemeClr val="tx1"/>
+              </a:solidFill>
+            </a:endParaRPr>
+          </a:p>
+        </p:txBody>
+      </p:sp>
+      <p:sp>
+        <p:nvSpPr>
+          <p:cNvPr id="6" name="Rectangle 5"/>
+          <p:cNvSpPr/>
+          <p:nvPr/>
+        </p:nvSpPr>
+        <p:spPr>
+          <a:xfrm>
+            <a:off x="4021090" y="5458434"/>
+            <a:ext cx="1096703" cy="729116"/>
+          </a:xfrm>
+          <a:prstGeom prst="rect">
+            <a:avLst/>
+          </a:prstGeom>
+          <a:solidFill>
+            <a:schemeClr val="accent3">
+              <a:lumMod val="20000"/>
+              <a:lumOff val="80000"/>
+            </a:schemeClr>
+          </a:solidFill>
+        </p:spPr>
+        <p:style>
+          <a:lnRef idx="1">
+            <a:schemeClr val="accent1"/>
+          </a:lnRef>
+          <a:fillRef idx="2">
+            <a:schemeClr val="accent1"/>
+          </a:fillRef>
+          <a:effectRef idx="1">
+            <a:schemeClr val="accent1"/>
+          </a:effectRef>
+          <a:fontRef idx="minor">
+            <a:schemeClr val="dk1"/>
+          </a:fontRef>
+        </p:style>
+        <p:txBody>
+          <a:bodyPr rtlCol="0" anchor="ctr"/>
+          <a:lstStyle/>
+          <a:p>
+            <a:pPr algn="ctr"/>
+            <a:r>
+              <a:rPr lang="en-US" sz="1600" dirty="0" smtClean="0">
+                <a:solidFill>
+                  <a:schemeClr val="tx1"/>
+                </a:solidFill>
+              </a:rPr>
+              <a:t>Plan</a:t>
+            </a:r>
+          </a:p>
+          <a:p>
+            <a:pPr algn="ctr"/>
+            <a:r>
+              <a:rPr lang="en-US" sz="1600" dirty="0" smtClean="0">
+                <a:solidFill>
+                  <a:schemeClr val="tx1"/>
+                </a:solidFill>
+              </a:rPr>
+              <a:t>Database</a:t>
+            </a:r>
+            <a:endParaRPr lang="en-US" sz="1600" dirty="0">
+              <a:solidFill>
+                <a:schemeClr val="tx1"/>
+              </a:solidFill>
+            </a:endParaRPr>
+          </a:p>
+        </p:txBody>
+      </p:sp>
+      <p:sp>
+        <p:nvSpPr>
+          <p:cNvPr id="7" name="Rectangle 6"/>
+          <p:cNvSpPr/>
+          <p:nvPr/>
+        </p:nvSpPr>
+        <p:spPr>
+          <a:xfrm>
+            <a:off x="5255376" y="5458434"/>
+            <a:ext cx="1096703" cy="729116"/>
+          </a:xfrm>
+          <a:prstGeom prst="rect">
+            <a:avLst/>
+          </a:prstGeom>
+          <a:solidFill>
+            <a:schemeClr val="accent3">
+              <a:lumMod val="20000"/>
+              <a:lumOff val="80000"/>
+            </a:schemeClr>
+          </a:solidFill>
+        </p:spPr>
+        <p:style>
+          <a:lnRef idx="1">
+            <a:schemeClr val="accent1"/>
+          </a:lnRef>
+          <a:fillRef idx="2">
+            <a:schemeClr val="accent1"/>
+          </a:fillRef>
+          <a:effectRef idx="1">
+            <a:schemeClr val="accent1"/>
+          </a:effectRef>
+          <a:fontRef idx="minor">
+            <a:schemeClr val="dk1"/>
+          </a:fontRef>
+        </p:style>
+        <p:txBody>
+          <a:bodyPr rtlCol="0" anchor="ctr"/>
+          <a:lstStyle/>
+          <a:p>
+            <a:pPr algn="ctr"/>
+            <a:r>
+              <a:rPr lang="en-US" sz="1600" dirty="0" smtClean="0">
+                <a:solidFill>
+                  <a:schemeClr val="tx1"/>
+                </a:solidFill>
+              </a:rPr>
+              <a:t>Constraint</a:t>
+            </a:r>
+          </a:p>
+          <a:p>
+            <a:pPr algn="ctr"/>
+            <a:r>
+              <a:rPr lang="en-US" sz="1600" dirty="0" smtClean="0">
+                <a:solidFill>
+                  <a:schemeClr val="tx1"/>
+                </a:solidFill>
+              </a:rPr>
+              <a:t>Engine</a:t>
+            </a:r>
+            <a:endParaRPr lang="en-US" sz="1600" dirty="0">
+              <a:solidFill>
+                <a:schemeClr val="tx1"/>
+              </a:solidFill>
+            </a:endParaRPr>
+          </a:p>
+        </p:txBody>
+      </p:sp>
+      <p:sp>
+        <p:nvSpPr>
+          <p:cNvPr id="10" name="Rounded Rectangle 9"/>
+          <p:cNvSpPr/>
+          <p:nvPr/>
+        </p:nvSpPr>
+        <p:spPr>
+          <a:xfrm>
+            <a:off x="1878023" y="2159001"/>
+            <a:ext cx="5372081" cy="547688"/>
+          </a:xfrm>
+          <a:prstGeom prst="roundRect">
+            <a:avLst/>
+          </a:prstGeom>
+        </p:spPr>
+        <p:style>
+          <a:lnRef idx="1">
+            <a:schemeClr val="accent6"/>
+          </a:lnRef>
+          <a:fillRef idx="2">
+            <a:schemeClr val="accent6"/>
+          </a:fillRef>
+          <a:effectRef idx="1">
+            <a:schemeClr val="accent6"/>
+          </a:effectRef>
+          <a:fontRef idx="minor">
+            <a:schemeClr val="dk1"/>
+          </a:fontRef>
+        </p:style>
+        <p:txBody>
+          <a:bodyPr rtlCol="0" anchor="ctr"/>
+          <a:lstStyle/>
+          <a:p>
+            <a:pPr algn="ctr"/>
+            <a:r>
+              <a:rPr lang="en-US" dirty="0" smtClean="0">
+                <a:solidFill>
+                  <a:srgbClr val="000000"/>
+                </a:solidFill>
+              </a:rPr>
+              <a:t>Client API</a:t>
+            </a:r>
+            <a:endParaRPr lang="en-US" dirty="0">
+              <a:solidFill>
+                <a:srgbClr val="000000"/>
+              </a:solidFill>
+            </a:endParaRPr>
+          </a:p>
+        </p:txBody>
+      </p:sp>
+      <p:sp>
+        <p:nvSpPr>
+          <p:cNvPr id="11" name="Rounded Rectangle 10"/>
+          <p:cNvSpPr/>
+          <p:nvPr/>
+        </p:nvSpPr>
+        <p:spPr>
+          <a:xfrm>
+            <a:off x="1470469" y="3015325"/>
+            <a:ext cx="6187188" cy="1564905"/>
+          </a:xfrm>
+          <a:prstGeom prst="roundRect">
+            <a:avLst/>
+          </a:prstGeom>
+          <a:noFill/>
+        </p:spPr>
+        <p:style>
+          <a:lnRef idx="1">
+            <a:schemeClr val="accent1"/>
+          </a:lnRef>
+          <a:fillRef idx="3">
+            <a:schemeClr val="accent1"/>
+          </a:fillRef>
+          <a:effectRef idx="2">
+            <a:schemeClr val="accent1"/>
+          </a:effectRef>
+          <a:fontRef idx="minor">
+            <a:schemeClr val="lt1"/>
+          </a:fontRef>
+        </p:style>
+        <p:txBody>
+          <a:bodyPr rtlCol="0" anchor="ctr"/>
+          <a:lstStyle/>
+          <a:p>
+            <a:pPr algn="ctr"/>
+            <a:endParaRPr lang="en-US" dirty="0"/>
+          </a:p>
+        </p:txBody>
+      </p:sp>
+      <p:sp>
+        <p:nvSpPr>
+          <p:cNvPr id="12" name="TextBox 11"/>
+          <p:cNvSpPr txBox="1"/>
+          <p:nvPr/>
+        </p:nvSpPr>
+        <p:spPr>
+          <a:xfrm>
+            <a:off x="3606109" y="3015325"/>
+            <a:ext cx="1915909" cy="369332"/>
+          </a:xfrm>
+          <a:prstGeom prst="rect">
+            <a:avLst/>
+          </a:prstGeom>
+          <a:noFill/>
+        </p:spPr>
+        <p:txBody>
+          <a:bodyPr wrap="none" rtlCol="0">
+            <a:spAutoFit/>
+          </a:bodyPr>
+          <a:lstStyle/>
+          <a:p>
+            <a:r>
+              <a:rPr lang="en-US" dirty="0" smtClean="0"/>
+              <a:t>Built-in Extensions</a:t>
+            </a:r>
+            <a:endParaRPr lang="en-US" dirty="0"/>
+          </a:p>
+        </p:txBody>
+      </p:sp>
+      <p:sp>
+        <p:nvSpPr>
+          <p:cNvPr id="16" name="Rectangle 15"/>
+          <p:cNvSpPr/>
+          <p:nvPr/>
+        </p:nvSpPr>
+        <p:spPr>
+          <a:xfrm>
+            <a:off x="2786804" y="3656091"/>
+            <a:ext cx="1096703" cy="729116"/>
+          </a:xfrm>
+          <a:prstGeom prst="rect">
+            <a:avLst/>
+          </a:prstGeom>
+        </p:spPr>
+        <p:style>
+          <a:lnRef idx="1">
+            <a:schemeClr val="accent1"/>
+          </a:lnRef>
+          <a:fillRef idx="3">
+            <a:schemeClr val="accent1"/>
+          </a:fillRef>
+          <a:effectRef idx="2">
+            <a:schemeClr val="accent1"/>
+          </a:effectRef>
+          <a:fontRef idx="minor">
+            <a:schemeClr val="lt1"/>
+          </a:fontRef>
+        </p:style>
+        <p:txBody>
+          <a:bodyPr rtlCol="0" anchor="ctr"/>
+          <a:lstStyle/>
+          <a:p>
+            <a:pPr algn="ctr"/>
+            <a:r>
+              <a:rPr lang="en-US" sz="1600" dirty="0" smtClean="0">
+                <a:solidFill>
+                  <a:schemeClr val="tx1"/>
+                </a:solidFill>
+              </a:rPr>
+              <a:t>Temporal</a:t>
+            </a:r>
+          </a:p>
+          <a:p>
+            <a:pPr algn="ctr"/>
+            <a:r>
+              <a:rPr lang="en-US" sz="1600" dirty="0" smtClean="0">
+                <a:solidFill>
+                  <a:schemeClr val="tx1"/>
+                </a:solidFill>
+              </a:rPr>
+              <a:t>Network</a:t>
+            </a:r>
+          </a:p>
+        </p:txBody>
+      </p:sp>
+      <p:sp>
+        <p:nvSpPr>
+          <p:cNvPr id="17" name="Rectangle 16"/>
+          <p:cNvSpPr/>
+          <p:nvPr/>
+        </p:nvSpPr>
+        <p:spPr>
+          <a:xfrm>
+            <a:off x="4021090" y="3667735"/>
+            <a:ext cx="1096703" cy="729116"/>
+          </a:xfrm>
+          <a:prstGeom prst="rect">
+            <a:avLst/>
+          </a:prstGeom>
+        </p:spPr>
+        <p:style>
+          <a:lnRef idx="1">
+            <a:schemeClr val="accent1"/>
+          </a:lnRef>
+          <a:fillRef idx="3">
+            <a:schemeClr val="accent1"/>
+          </a:fillRef>
+          <a:effectRef idx="2">
+            <a:schemeClr val="accent1"/>
+          </a:effectRef>
+          <a:fontRef idx="minor">
+            <a:schemeClr val="lt1"/>
+          </a:fontRef>
+        </p:style>
+        <p:txBody>
+          <a:bodyPr rtlCol="0" anchor="ctr"/>
+          <a:lstStyle/>
+          <a:p>
+            <a:pPr algn="ctr"/>
+            <a:r>
+              <a:rPr lang="en-US" sz="1600" dirty="0" smtClean="0">
+                <a:solidFill>
+                  <a:schemeClr val="tx1"/>
+                </a:solidFill>
+              </a:rPr>
+              <a:t>Resources</a:t>
+            </a:r>
+          </a:p>
+          <a:p>
+            <a:pPr algn="ctr"/>
+            <a:r>
+              <a:rPr lang="en-US" sz="1600" dirty="0" smtClean="0">
+                <a:solidFill>
+                  <a:schemeClr val="tx1"/>
+                </a:solidFill>
+              </a:rPr>
+              <a:t>Reasoning</a:t>
+            </a:r>
+            <a:endParaRPr lang="en-US" sz="1600" dirty="0">
+              <a:solidFill>
+                <a:schemeClr val="tx1"/>
+              </a:solidFill>
+            </a:endParaRPr>
+          </a:p>
+        </p:txBody>
+      </p:sp>
+      <p:sp>
+        <p:nvSpPr>
+          <p:cNvPr id="18" name="Rectangle 17"/>
+          <p:cNvSpPr/>
+          <p:nvPr/>
+        </p:nvSpPr>
+        <p:spPr>
+          <a:xfrm>
+            <a:off x="1552518" y="3667735"/>
+            <a:ext cx="1096703" cy="729116"/>
+          </a:xfrm>
+          <a:prstGeom prst="rect">
+            <a:avLst/>
+          </a:prstGeom>
+        </p:spPr>
+        <p:style>
+          <a:lnRef idx="1">
+            <a:schemeClr val="accent1"/>
+          </a:lnRef>
+          <a:fillRef idx="3">
+            <a:schemeClr val="accent1"/>
+          </a:fillRef>
+          <a:effectRef idx="2">
+            <a:schemeClr val="accent1"/>
+          </a:effectRef>
+          <a:fontRef idx="minor">
+            <a:schemeClr val="lt1"/>
+          </a:fontRef>
+        </p:style>
+        <p:txBody>
+          <a:bodyPr rtlCol="0" anchor="ctr"/>
+          <a:lstStyle/>
+          <a:p>
+            <a:pPr algn="ctr"/>
+            <a:r>
+              <a:rPr lang="en-US" sz="1200" dirty="0" smtClean="0">
+                <a:solidFill>
+                  <a:schemeClr val="tx1"/>
+                </a:solidFill>
+              </a:rPr>
+              <a:t>Chronological</a:t>
+            </a:r>
+          </a:p>
+          <a:p>
+            <a:pPr algn="ctr"/>
+            <a:r>
+              <a:rPr lang="en-US" sz="1200" dirty="0" smtClean="0">
+                <a:solidFill>
+                  <a:schemeClr val="tx1"/>
+                </a:solidFill>
+              </a:rPr>
+              <a:t>Backtracking</a:t>
+            </a:r>
+          </a:p>
+          <a:p>
+            <a:pPr algn="ctr"/>
+            <a:r>
+              <a:rPr lang="en-US" sz="1200" dirty="0" smtClean="0">
+                <a:solidFill>
+                  <a:schemeClr val="tx1"/>
+                </a:solidFill>
+              </a:rPr>
+              <a:t>Solver</a:t>
+            </a:r>
+          </a:p>
+        </p:txBody>
+      </p:sp>
+      <p:sp>
+        <p:nvSpPr>
+          <p:cNvPr id="19" name="Rectangle 18"/>
+          <p:cNvSpPr/>
+          <p:nvPr/>
+        </p:nvSpPr>
+        <p:spPr>
+          <a:xfrm>
+            <a:off x="5255376" y="3656091"/>
+            <a:ext cx="1096703" cy="729116"/>
+          </a:xfrm>
+          <a:prstGeom prst="rect">
+            <a:avLst/>
+          </a:prstGeom>
+        </p:spPr>
+        <p:style>
+          <a:lnRef idx="1">
+            <a:schemeClr val="accent1"/>
+          </a:lnRef>
+          <a:fillRef idx="3">
+            <a:schemeClr val="accent1"/>
+          </a:fillRef>
+          <a:effectRef idx="2">
+            <a:schemeClr val="accent1"/>
+          </a:effectRef>
+          <a:fontRef idx="minor">
+            <a:schemeClr val="lt1"/>
+          </a:fontRef>
+        </p:style>
+        <p:txBody>
+          <a:bodyPr rtlCol="0" anchor="ctr"/>
+          <a:lstStyle/>
+          <a:p>
+            <a:pPr algn="ctr"/>
+            <a:r>
+              <a:rPr lang="en-US" sz="1600" dirty="0" smtClean="0">
+                <a:solidFill>
+                  <a:schemeClr val="tx1"/>
+                </a:solidFill>
+              </a:rPr>
+              <a:t>Constraint</a:t>
+            </a:r>
+          </a:p>
+          <a:p>
+            <a:pPr algn="ctr"/>
+            <a:r>
+              <a:rPr lang="en-US" sz="1600" dirty="0" smtClean="0">
+                <a:solidFill>
+                  <a:schemeClr val="tx1"/>
+                </a:solidFill>
+              </a:rPr>
+              <a:t>Library</a:t>
+            </a:r>
+            <a:endParaRPr lang="en-US" sz="1600" dirty="0">
+              <a:solidFill>
+                <a:schemeClr val="tx1"/>
+              </a:solidFill>
+            </a:endParaRPr>
+          </a:p>
+        </p:txBody>
+      </p:sp>
+      <p:sp>
+        <p:nvSpPr>
+          <p:cNvPr id="20" name="Rectangle 19"/>
+          <p:cNvSpPr/>
+          <p:nvPr/>
+        </p:nvSpPr>
+        <p:spPr>
+          <a:xfrm>
+            <a:off x="6489662" y="3656091"/>
+            <a:ext cx="1096703" cy="729116"/>
+          </a:xfrm>
+          <a:prstGeom prst="rect">
+            <a:avLst/>
+          </a:prstGeom>
+        </p:spPr>
+        <p:style>
+          <a:lnRef idx="1">
+            <a:schemeClr val="accent1"/>
+          </a:lnRef>
+          <a:fillRef idx="3">
+            <a:schemeClr val="accent1"/>
+          </a:fillRef>
+          <a:effectRef idx="2">
+            <a:schemeClr val="accent1"/>
+          </a:effectRef>
+          <a:fontRef idx="minor">
+            <a:schemeClr val="lt1"/>
+          </a:fontRef>
+        </p:style>
+        <p:txBody>
+          <a:bodyPr rtlCol="0" anchor="ctr"/>
+          <a:lstStyle/>
+          <a:p>
+            <a:pPr algn="ctr"/>
+            <a:r>
+              <a:rPr lang="en-US" sz="1200" dirty="0" smtClean="0">
+                <a:solidFill>
+                  <a:schemeClr val="tx1"/>
+                </a:solidFill>
+              </a:rPr>
+              <a:t>Modeling Language Support</a:t>
+            </a:r>
+          </a:p>
+          <a:p>
+            <a:pPr algn="ctr"/>
+            <a:r>
+              <a:rPr lang="en-US" sz="1200" dirty="0" smtClean="0">
+                <a:solidFill>
+                  <a:schemeClr val="tx1"/>
+                </a:solidFill>
+              </a:rPr>
+              <a:t>(NDDL, ANML)</a:t>
+            </a:r>
+            <a:endParaRPr lang="en-US" sz="1200" dirty="0">
+              <a:solidFill>
+                <a:schemeClr val="tx1"/>
+              </a:solidFill>
+            </a:endParaRPr>
+          </a:p>
+        </p:txBody>
+      </p:sp>
+      <p:sp>
+        <p:nvSpPr>
+          <p:cNvPr id="21" name="Rounded Rectangle 20"/>
+          <p:cNvSpPr/>
+          <p:nvPr/>
+        </p:nvSpPr>
+        <p:spPr>
+          <a:xfrm>
+            <a:off x="2648770" y="620713"/>
+            <a:ext cx="1464516" cy="547687"/>
+          </a:xfrm>
+          <a:prstGeom prst="roundRect">
+            <a:avLst/>
+          </a:prstGeom>
+        </p:spPr>
+        <p:style>
+          <a:lnRef idx="1">
+            <a:schemeClr val="dk1"/>
+          </a:lnRef>
+          <a:fillRef idx="2">
+            <a:schemeClr val="dk1"/>
+          </a:fillRef>
+          <a:effectRef idx="1">
+            <a:schemeClr val="dk1"/>
+          </a:effectRef>
+          <a:fontRef idx="minor">
+            <a:schemeClr val="dk1"/>
+          </a:fontRef>
+        </p:style>
+        <p:txBody>
+          <a:bodyPr rtlCol="0" anchor="ctr"/>
+          <a:lstStyle/>
+          <a:p>
+            <a:pPr algn="ctr"/>
+            <a:r>
+              <a:rPr lang="en-US" sz="1600" dirty="0" smtClean="0">
+                <a:solidFill>
+                  <a:srgbClr val="000000"/>
+                </a:solidFill>
+              </a:rPr>
+              <a:t>Client Application</a:t>
+            </a:r>
+            <a:endParaRPr lang="en-US" sz="1600" dirty="0">
+              <a:solidFill>
+                <a:srgbClr val="000000"/>
+              </a:solidFill>
+            </a:endParaRPr>
+          </a:p>
+        </p:txBody>
+      </p:sp>
+      <p:sp>
+        <p:nvSpPr>
+          <p:cNvPr id="22" name="Rounded Rectangle 21"/>
+          <p:cNvSpPr/>
+          <p:nvPr/>
+        </p:nvSpPr>
+        <p:spPr>
+          <a:xfrm>
+            <a:off x="3446766" y="620713"/>
+            <a:ext cx="1464516" cy="547687"/>
+          </a:xfrm>
+          <a:prstGeom prst="roundRect">
+            <a:avLst/>
+          </a:prstGeom>
+        </p:spPr>
+        <p:style>
+          <a:lnRef idx="1">
+            <a:schemeClr val="dk1"/>
+          </a:lnRef>
+          <a:fillRef idx="2">
+            <a:schemeClr val="dk1"/>
+          </a:fillRef>
+          <a:effectRef idx="1">
+            <a:schemeClr val="dk1"/>
+          </a:effectRef>
+          <a:fontRef idx="minor">
+            <a:schemeClr val="dk1"/>
+          </a:fontRef>
+        </p:style>
+        <p:txBody>
+          <a:bodyPr rtlCol="0" anchor="ctr"/>
+          <a:lstStyle/>
+          <a:p>
+            <a:pPr algn="ctr"/>
+            <a:r>
+              <a:rPr lang="en-US" sz="1600" dirty="0" smtClean="0">
+                <a:solidFill>
+                  <a:srgbClr val="000000"/>
+                </a:solidFill>
+              </a:rPr>
+              <a:t>Client Application</a:t>
+            </a:r>
+            <a:endParaRPr lang="en-US" sz="1600" dirty="0">
+              <a:solidFill>
+                <a:srgbClr val="000000"/>
+              </a:solidFill>
+            </a:endParaRPr>
+          </a:p>
+        </p:txBody>
+      </p:sp>
+      <p:sp>
+        <p:nvSpPr>
+          <p:cNvPr id="23" name="Rounded Rectangle 22"/>
+          <p:cNvSpPr/>
+          <p:nvPr/>
+        </p:nvSpPr>
+        <p:spPr>
+          <a:xfrm>
+            <a:off x="4265686" y="620713"/>
+            <a:ext cx="1464516" cy="547687"/>
+          </a:xfrm>
+          <a:prstGeom prst="roundRect">
+            <a:avLst/>
+          </a:prstGeom>
+        </p:spPr>
+        <p:style>
+          <a:lnRef idx="1">
+            <a:schemeClr val="dk1"/>
+          </a:lnRef>
+          <a:fillRef idx="2">
+            <a:schemeClr val="dk1"/>
+          </a:fillRef>
+          <a:effectRef idx="1">
+            <a:schemeClr val="dk1"/>
+          </a:effectRef>
+          <a:fontRef idx="minor">
+            <a:schemeClr val="dk1"/>
+          </a:fontRef>
+        </p:style>
+        <p:txBody>
+          <a:bodyPr rtlCol="0" anchor="ctr"/>
+          <a:lstStyle/>
+          <a:p>
+            <a:pPr algn="ctr"/>
+            <a:r>
+              <a:rPr lang="en-US" sz="1600" dirty="0" smtClean="0">
+                <a:solidFill>
+                  <a:srgbClr val="000000"/>
+                </a:solidFill>
+              </a:rPr>
+              <a:t>Client Application</a:t>
+            </a:r>
+            <a:endParaRPr lang="en-US" sz="1600" dirty="0">
+              <a:solidFill>
+                <a:srgbClr val="000000"/>
+              </a:solidFill>
+            </a:endParaRPr>
+          </a:p>
+        </p:txBody>
+      </p:sp>
+      <p:sp>
+        <p:nvSpPr>
+          <p:cNvPr id="24" name="Rounded Rectangle 23"/>
+          <p:cNvSpPr/>
+          <p:nvPr/>
+        </p:nvSpPr>
+        <p:spPr>
+          <a:xfrm>
+            <a:off x="4939291" y="620713"/>
+            <a:ext cx="1464516" cy="547687"/>
+          </a:xfrm>
+          <a:prstGeom prst="roundRect">
+            <a:avLst/>
+          </a:prstGeom>
+        </p:spPr>
+        <p:style>
+          <a:lnRef idx="1">
+            <a:schemeClr val="dk1"/>
+          </a:lnRef>
+          <a:fillRef idx="2">
+            <a:schemeClr val="dk1"/>
+          </a:fillRef>
+          <a:effectRef idx="1">
+            <a:schemeClr val="dk1"/>
+          </a:effectRef>
+          <a:fontRef idx="minor">
+            <a:schemeClr val="dk1"/>
+          </a:fontRef>
+        </p:style>
+        <p:txBody>
+          <a:bodyPr rtlCol="0" anchor="ctr"/>
+          <a:lstStyle/>
+          <a:p>
+            <a:pPr algn="ctr"/>
+            <a:r>
+              <a:rPr lang="en-US" sz="1600" dirty="0" smtClean="0">
+                <a:solidFill>
+                  <a:srgbClr val="000000"/>
+                </a:solidFill>
+              </a:rPr>
+              <a:t>Client Application</a:t>
+            </a:r>
+            <a:endParaRPr lang="en-US" sz="1600" dirty="0">
+              <a:solidFill>
+                <a:srgbClr val="000000"/>
+              </a:solidFill>
+            </a:endParaRPr>
+          </a:p>
+        </p:txBody>
+      </p:sp>
+      <p:sp>
+        <p:nvSpPr>
+          <p:cNvPr id="25" name="Up-Down Arrow 24"/>
+          <p:cNvSpPr/>
+          <p:nvPr/>
+        </p:nvSpPr>
+        <p:spPr>
+          <a:xfrm>
+            <a:off x="4467355" y="1168400"/>
+            <a:ext cx="193416" cy="990601"/>
+          </a:xfrm>
+          <a:prstGeom prst="upDownArrow">
+            <a:avLst/>
+          </a:prstGeom>
+          <a:solidFill>
+            <a:srgbClr val="FFFFFF"/>
+          </a:solidFill>
+          <a:ln w="19050" cmpd="sng">
+            <a:solidFill>
+              <a:schemeClr val="tx1"/>
+            </a:solidFill>
+          </a:ln>
+        </p:spPr>
+        <p:style>
+          <a:lnRef idx="1">
+            <a:schemeClr val="accent1"/>
+          </a:lnRef>
+          <a:fillRef idx="3">
+            <a:schemeClr val="accent1"/>
+          </a:fillRef>
+          <a:effectRef idx="2">
+            <a:schemeClr val="accent1"/>
+          </a:effectRef>
+          <a:fontRef idx="minor">
+            <a:schemeClr val="lt1"/>
+          </a:fontRef>
+        </p:style>
+        <p:txBody>
+          <a:bodyPr rtlCol="0" anchor="ctr"/>
+          <a:lstStyle/>
+          <a:p>
+            <a:pPr algn="ctr"/>
+            <a:endParaRPr lang="en-US"/>
+          </a:p>
+        </p:txBody>
+      </p:sp>
+      <p:sp>
+        <p:nvSpPr>
+          <p:cNvPr id="28" name="Rectangle 27"/>
+          <p:cNvSpPr/>
+          <p:nvPr/>
+        </p:nvSpPr>
+        <p:spPr>
+          <a:xfrm>
+            <a:off x="6489662" y="5456321"/>
+            <a:ext cx="1096703" cy="729116"/>
+          </a:xfrm>
+          <a:prstGeom prst="rect">
+            <a:avLst/>
+          </a:prstGeom>
+          <a:solidFill>
+            <a:schemeClr val="accent3">
+              <a:lumMod val="20000"/>
+              <a:lumOff val="80000"/>
+            </a:schemeClr>
+          </a:solidFill>
+        </p:spPr>
+        <p:style>
+          <a:lnRef idx="1">
+            <a:schemeClr val="accent1"/>
+          </a:lnRef>
+          <a:fillRef idx="2">
+            <a:schemeClr val="accent1"/>
+          </a:fillRef>
+          <a:effectRef idx="1">
+            <a:schemeClr val="accent1"/>
+          </a:effectRef>
+          <a:fontRef idx="minor">
+            <a:schemeClr val="dk1"/>
+          </a:fontRef>
+        </p:style>
+        <p:txBody>
+          <a:bodyPr rtlCol="0" anchor="ctr"/>
+          <a:lstStyle/>
+          <a:p>
+            <a:pPr algn="ctr"/>
+            <a:r>
+              <a:rPr lang="en-US" sz="1600" dirty="0" smtClean="0">
+                <a:solidFill>
+                  <a:schemeClr val="tx1"/>
+                </a:solidFill>
+              </a:rPr>
+              <a:t>Model</a:t>
+            </a:r>
+          </a:p>
+          <a:p>
+            <a:pPr algn="ctr"/>
+            <a:r>
+              <a:rPr lang="en-US" sz="1600" dirty="0" smtClean="0">
+                <a:solidFill>
+                  <a:schemeClr val="tx1"/>
+                </a:solidFill>
+              </a:rPr>
+              <a:t>Interpreter</a:t>
+            </a:r>
+            <a:endParaRPr lang="en-US" sz="1600" dirty="0">
+              <a:solidFill>
+                <a:schemeClr val="tx1"/>
+              </a:solidFill>
+            </a:endParaRPr>
+          </a:p>
+        </p:txBody>
+      </p:sp>
+      <p:sp>
+        <p:nvSpPr>
+          <p:cNvPr id="9" name="TextBox 8"/>
+          <p:cNvSpPr txBox="1"/>
+          <p:nvPr/>
+        </p:nvSpPr>
+        <p:spPr>
+          <a:xfrm>
+            <a:off x="2894974" y="1571626"/>
+            <a:ext cx="3144761" cy="461665"/>
+          </a:xfrm>
+          <a:prstGeom prst="rect">
+            <a:avLst/>
+          </a:prstGeom>
+          <a:noFill/>
+        </p:spPr>
+        <p:txBody>
+          <a:bodyPr wrap="none" rtlCol="0">
+            <a:spAutoFit/>
+          </a:bodyPr>
+          <a:lstStyle/>
+          <a:p>
+            <a:r>
+              <a:rPr lang="en-US" sz="2400" b="1" dirty="0" smtClean="0"/>
+              <a:t>EUROPA      </a:t>
+            </a:r>
+            <a:r>
+              <a:rPr lang="en-US" sz="2400" b="1" dirty="0" smtClean="0"/>
+              <a:t>Framework</a:t>
+            </a:r>
+            <a:endParaRPr lang="en-US" sz="2400" b="1" dirty="0"/>
+          </a:p>
+        </p:txBody>
+      </p:sp>
+      <p:sp>
+        <p:nvSpPr>
+          <p:cNvPr id="8" name="Rounded Rectangle 7"/>
+          <p:cNvSpPr/>
+          <p:nvPr/>
+        </p:nvSpPr>
+        <p:spPr>
+          <a:xfrm>
+            <a:off x="1150938" y="1571626"/>
+            <a:ext cx="6826250" cy="4897438"/>
+          </a:xfrm>
+          <a:prstGeom prst="roundRect">
+            <a:avLst/>
+          </a:prstGeom>
+          <a:noFill/>
+          <a:ln w="19050" cmpd="sng"/>
+        </p:spPr>
+        <p:style>
+          <a:lnRef idx="1">
+            <a:schemeClr val="accent1"/>
+          </a:lnRef>
+          <a:fillRef idx="3">
+            <a:schemeClr val="accent1"/>
+          </a:fillRef>
+          <a:effectRef idx="2">
+            <a:schemeClr val="accent1"/>
+          </a:effectRef>
+          <a:fontRef idx="minor">
+            <a:schemeClr val="lt1"/>
+          </a:fontRef>
+        </p:style>
+        <p:txBody>
+          <a:bodyPr rtlCol="0" anchor="ctr"/>
+          <a:lstStyle/>
+          <a:p>
+            <a:pPr algn="ctr"/>
+            <a:endParaRPr lang="en-US"/>
+          </a:p>
+        </p:txBody>
+      </p:sp>
+    </p:spTree>
+    <p:extLst>
+      <p:ext uri="{BB962C8B-B14F-4D97-AF65-F5344CB8AC3E}">
+        <p14:creationId xmlns:p14="http://schemas.microsoft.com/office/powerpoint/2010/main" val="2818633388"/>
       </p:ext>
     </p:extLst>
   </p:cSld>

</xml_diff>

<commit_message>
Updated the Architecture figure(s) (source in the PPT file and two pdf figures in ICKEPS & PSTL)
</commit_message>
<xml_diff>
--- a/Publications/trunk/2012/IKEPS/CameraReady/Figures/Figures.pptx
+++ b/Publications/trunk/2012/IKEPS/CameraReady/Figures/Figures.pptx
@@ -302,7 +302,7 @@
           <a:p>
             <a:fld id="{1E9B8AF5-EFAB-3141-9A6D-82E91B20F679}" type="datetimeFigureOut">
               <a:rPr lang="en-US" smtClean="0"/>
-              <a:t>5/23/12</a:t>
+              <a:t>5/25/12</a:t>
             </a:fld>
             <a:endParaRPr lang="en-US"/>
           </a:p>
@@ -472,7 +472,7 @@
           <a:p>
             <a:fld id="{1E9B8AF5-EFAB-3141-9A6D-82E91B20F679}" type="datetimeFigureOut">
               <a:rPr lang="en-US" smtClean="0"/>
-              <a:t>5/23/12</a:t>
+              <a:t>5/25/12</a:t>
             </a:fld>
             <a:endParaRPr lang="en-US"/>
           </a:p>
@@ -652,7 +652,7 @@
           <a:p>
             <a:fld id="{1E9B8AF5-EFAB-3141-9A6D-82E91B20F679}" type="datetimeFigureOut">
               <a:rPr lang="en-US" smtClean="0"/>
-              <a:t>5/23/12</a:t>
+              <a:t>5/25/12</a:t>
             </a:fld>
             <a:endParaRPr lang="en-US"/>
           </a:p>
@@ -822,7 +822,7 @@
           <a:p>
             <a:fld id="{1E9B8AF5-EFAB-3141-9A6D-82E91B20F679}" type="datetimeFigureOut">
               <a:rPr lang="en-US" smtClean="0"/>
-              <a:t>5/23/12</a:t>
+              <a:t>5/25/12</a:t>
             </a:fld>
             <a:endParaRPr lang="en-US"/>
           </a:p>
@@ -1068,7 +1068,7 @@
           <a:p>
             <a:fld id="{1E9B8AF5-EFAB-3141-9A6D-82E91B20F679}" type="datetimeFigureOut">
               <a:rPr lang="en-US" smtClean="0"/>
-              <a:t>5/23/12</a:t>
+              <a:t>5/25/12</a:t>
             </a:fld>
             <a:endParaRPr lang="en-US"/>
           </a:p>
@@ -1356,7 +1356,7 @@
           <a:p>
             <a:fld id="{1E9B8AF5-EFAB-3141-9A6D-82E91B20F679}" type="datetimeFigureOut">
               <a:rPr lang="en-US" smtClean="0"/>
-              <a:t>5/23/12</a:t>
+              <a:t>5/25/12</a:t>
             </a:fld>
             <a:endParaRPr lang="en-US"/>
           </a:p>
@@ -1778,7 +1778,7 @@
           <a:p>
             <a:fld id="{1E9B8AF5-EFAB-3141-9A6D-82E91B20F679}" type="datetimeFigureOut">
               <a:rPr lang="en-US" smtClean="0"/>
-              <a:t>5/23/12</a:t>
+              <a:t>5/25/12</a:t>
             </a:fld>
             <a:endParaRPr lang="en-US"/>
           </a:p>
@@ -1896,7 +1896,7 @@
           <a:p>
             <a:fld id="{1E9B8AF5-EFAB-3141-9A6D-82E91B20F679}" type="datetimeFigureOut">
               <a:rPr lang="en-US" smtClean="0"/>
-              <a:t>5/23/12</a:t>
+              <a:t>5/25/12</a:t>
             </a:fld>
             <a:endParaRPr lang="en-US"/>
           </a:p>
@@ -1991,7 +1991,7 @@
           <a:p>
             <a:fld id="{1E9B8AF5-EFAB-3141-9A6D-82E91B20F679}" type="datetimeFigureOut">
               <a:rPr lang="en-US" smtClean="0"/>
-              <a:t>5/23/12</a:t>
+              <a:t>5/25/12</a:t>
             </a:fld>
             <a:endParaRPr lang="en-US"/>
           </a:p>
@@ -2268,7 +2268,7 @@
           <a:p>
             <a:fld id="{1E9B8AF5-EFAB-3141-9A6D-82E91B20F679}" type="datetimeFigureOut">
               <a:rPr lang="en-US" smtClean="0"/>
-              <a:t>5/23/12</a:t>
+              <a:t>5/25/12</a:t>
             </a:fld>
             <a:endParaRPr lang="en-US"/>
           </a:p>
@@ -2521,7 +2521,7 @@
           <a:p>
             <a:fld id="{1E9B8AF5-EFAB-3141-9A6D-82E91B20F679}" type="datetimeFigureOut">
               <a:rPr lang="en-US" smtClean="0"/>
-              <a:t>5/23/12</a:t>
+              <a:t>5/25/12</a:t>
             </a:fld>
             <a:endParaRPr lang="en-US"/>
           </a:p>
@@ -2734,7 +2734,7 @@
           <a:p>
             <a:fld id="{1E9B8AF5-EFAB-3141-9A6D-82E91B20F679}" type="datetimeFigureOut">
               <a:rPr lang="en-US" smtClean="0"/>
-              <a:t>5/23/12</a:t>
+              <a:t>5/25/12</a:t>
             </a:fld>
             <a:endParaRPr lang="en-US"/>
           </a:p>
@@ -3567,7 +3567,7 @@
           <a:graphicData uri="http://schemas.openxmlformats.org/presentationml/2006/ole">
             <mc:AlternateContent xmlns:mc="http://schemas.openxmlformats.org/markup-compatibility/2006">
               <mc:Choice xmlns:v="urn:schemas-microsoft-com:vml" Requires="v">
-                <p:oleObj spid="_x0000_s1038" name="Document" r:id="rId4" imgW="5867400" imgH="2971800" progId="Word.Document.12">
+                <p:oleObj spid="_x0000_s1040" name="Document" r:id="rId4" imgW="5867400" imgH="2971800" progId="Word.Document.12">
                   <p:embed/>
                 </p:oleObj>
               </mc:Choice>
@@ -3912,7 +3912,7 @@
         </p:nvSpPr>
         <p:spPr>
           <a:xfrm>
-            <a:off x="1552518" y="5458434"/>
+            <a:off x="4021090" y="5456321"/>
             <a:ext cx="1096703" cy="729116"/>
           </a:xfrm>
           <a:prstGeom prst="rect">
@@ -3979,7 +3979,7 @@
         </p:nvSpPr>
         <p:spPr>
           <a:xfrm>
-            <a:off x="2786804" y="5458434"/>
+            <a:off x="5255376" y="5456321"/>
             <a:ext cx="1096703" cy="729116"/>
           </a:xfrm>
           <a:prstGeom prst="rect">
@@ -4035,7 +4035,7 @@
         </p:nvSpPr>
         <p:spPr>
           <a:xfrm>
-            <a:off x="4021090" y="5458434"/>
+            <a:off x="2786804" y="5458434"/>
             <a:ext cx="1096703" cy="729116"/>
           </a:xfrm>
           <a:prstGeom prst="rect">
@@ -4102,7 +4102,7 @@
         </p:nvSpPr>
         <p:spPr>
           <a:xfrm>
-            <a:off x="5255376" y="5458434"/>
+            <a:off x="1552067" y="5456321"/>
             <a:ext cx="1096703" cy="729116"/>
           </a:xfrm>
           <a:prstGeom prst="rect">
@@ -4315,7 +4315,7 @@
           <a:p>
             <a:pPr algn="ctr"/>
             <a:r>
-              <a:rPr lang="en-US" sz="1600" dirty="0" smtClean="0">
+              <a:rPr lang="en-US" sz="1300" dirty="0" smtClean="0">
                 <a:solidFill>
                   <a:schemeClr val="tx1"/>
                 </a:solidFill>
@@ -4326,7 +4326,7 @@
           <a:p>
             <a:pPr algn="ctr"/>
             <a:r>
-              <a:rPr lang="en-US" sz="1600" dirty="0" smtClean="0">
+              <a:rPr lang="en-US" sz="1300" dirty="0" smtClean="0">
                 <a:solidFill>
                   <a:schemeClr val="tx1"/>
                 </a:solidFill>
@@ -4371,7 +4371,7 @@
           <a:p>
             <a:pPr algn="ctr"/>
             <a:r>
-              <a:rPr lang="en-US" sz="1600" dirty="0" smtClean="0">
+              <a:rPr lang="en-US" sz="1300" dirty="0" smtClean="0">
                 <a:solidFill>
                   <a:schemeClr val="tx1"/>
                 </a:solidFill>
@@ -4382,14 +4382,14 @@
           <a:p>
             <a:pPr algn="ctr"/>
             <a:r>
-              <a:rPr lang="en-US" sz="1600" dirty="0" smtClean="0">
+              <a:rPr lang="en-US" sz="1300" dirty="0" smtClean="0">
                 <a:solidFill>
                   <a:schemeClr val="tx1"/>
                 </a:solidFill>
               </a:rPr>
-              <a:t>Reasoning</a:t>
-            </a:r>
-            <a:endParaRPr lang="en-US" sz="1600" dirty="0">
+              <a:t>Management</a:t>
+            </a:r>
+            <a:endParaRPr lang="en-US" sz="1300" dirty="0">
               <a:solidFill>
                 <a:schemeClr val="tx1"/>
               </a:solidFill>
@@ -4405,7 +4405,7 @@
         </p:nvSpPr>
         <p:spPr>
           <a:xfrm>
-            <a:off x="1552518" y="3667735"/>
+            <a:off x="5255376" y="3667735"/>
             <a:ext cx="1096703" cy="729116"/>
           </a:xfrm>
           <a:prstGeom prst="rect">
@@ -4472,7 +4472,7 @@
         </p:nvSpPr>
         <p:spPr>
           <a:xfrm>
-            <a:off x="5255376" y="3656091"/>
+            <a:off x="1552067" y="3667735"/>
             <a:ext cx="1096703" cy="729116"/>
           </a:xfrm>
           <a:prstGeom prst="rect">
@@ -4499,7 +4499,7 @@
           <a:p>
             <a:pPr algn="ctr"/>
             <a:r>
-              <a:rPr lang="en-US" sz="1600" dirty="0" smtClean="0">
+              <a:rPr lang="en-US" sz="1300" dirty="0" smtClean="0">
                 <a:solidFill>
                   <a:schemeClr val="tx1"/>
                 </a:solidFill>
@@ -4510,14 +4510,14 @@
           <a:p>
             <a:pPr algn="ctr"/>
             <a:r>
-              <a:rPr lang="en-US" sz="1600" dirty="0" smtClean="0">
+              <a:rPr lang="en-US" sz="1300" dirty="0" smtClean="0">
                 <a:solidFill>
                   <a:schemeClr val="tx1"/>
                 </a:solidFill>
               </a:rPr>
               <a:t>Library</a:t>
             </a:r>
-            <a:endParaRPr lang="en-US" sz="1600" dirty="0">
+            <a:endParaRPr lang="en-US" sz="1300" dirty="0">
               <a:solidFill>
                 <a:schemeClr val="tx1"/>
               </a:solidFill>
@@ -4565,8 +4565,32 @@
                   <a:schemeClr val="tx1"/>
                 </a:solidFill>
               </a:rPr>
-              <a:t>Modeling Language Support</a:t>
-            </a:r>
+              <a:t>Modeling </a:t>
+            </a:r>
+            <a:r>
+              <a:rPr lang="en-US" sz="1200" dirty="0" smtClean="0">
+                <a:solidFill>
+                  <a:schemeClr val="tx1"/>
+                </a:solidFill>
+              </a:rPr>
+              <a:t>Language</a:t>
+            </a:r>
+          </a:p>
+          <a:p>
+            <a:pPr algn="ctr"/>
+            <a:r>
+              <a:rPr lang="en-US" sz="1100" dirty="0" smtClean="0">
+                <a:solidFill>
+                  <a:schemeClr val="tx1"/>
+                </a:solidFill>
+              </a:rPr>
+              <a:t>Implementation</a:t>
+            </a:r>
+            <a:endParaRPr lang="en-US" sz="1100" dirty="0" smtClean="0">
+              <a:solidFill>
+                <a:schemeClr val="tx1"/>
+              </a:solidFill>
+            </a:endParaRPr>
           </a:p>
           <a:p>
             <a:pPr algn="ctr"/>
@@ -4923,11 +4947,7 @@
           <a:p>
             <a:r>
               <a:rPr lang="en-US" sz="2400" b="1" dirty="0" smtClean="0"/>
-              <a:t>EUROPA      </a:t>
-            </a:r>
-            <a:r>
-              <a:rPr lang="en-US" sz="2400" b="1" dirty="0" smtClean="0"/>
-              <a:t>Framework</a:t>
+              <a:t>EUROPA      Framework</a:t>
             </a:r>
             <a:endParaRPr lang="en-US" sz="2400" b="1" dirty="0"/>
           </a:p>

</xml_diff>